<commit_message>
Added Pictures for Presentations.
</commit_message>
<xml_diff>
--- a/doc/Searchrobot.pptx
+++ b/doc/Searchrobot.pptx
@@ -5,7 +5,7 @@
     <p:sldMasterId id="2147483828" r:id="rId1"/>
   </p:sldMasterIdLst>
   <p:notesMasterIdLst>
-    <p:notesMasterId r:id="rId20"/>
+    <p:notesMasterId r:id="rId22"/>
   </p:notesMasterIdLst>
   <p:sldIdLst>
     <p:sldId id="256" r:id="rId2"/>
@@ -20,12 +20,14 @@
     <p:sldId id="270" r:id="rId11"/>
     <p:sldId id="265" r:id="rId12"/>
     <p:sldId id="271" r:id="rId13"/>
-    <p:sldId id="272" r:id="rId14"/>
-    <p:sldId id="268" r:id="rId15"/>
-    <p:sldId id="273" r:id="rId16"/>
-    <p:sldId id="274" r:id="rId17"/>
-    <p:sldId id="275" r:id="rId18"/>
-    <p:sldId id="276" r:id="rId19"/>
+    <p:sldId id="279" r:id="rId14"/>
+    <p:sldId id="277" r:id="rId15"/>
+    <p:sldId id="272" r:id="rId16"/>
+    <p:sldId id="268" r:id="rId17"/>
+    <p:sldId id="273" r:id="rId18"/>
+    <p:sldId id="274" r:id="rId19"/>
+    <p:sldId id="275" r:id="rId20"/>
+    <p:sldId id="276" r:id="rId21"/>
   </p:sldIdLst>
   <p:sldSz cx="9144000" cy="6858000" type="screen4x3"/>
   <p:notesSz cx="6858000" cy="9144000"/>
@@ -124,6 +126,22 @@
       </a:defRPr>
     </a:lvl9pPr>
   </p:defaultTextStyle>
+  <p:extLst>
+    <p:ext uri="{EFAFB233-063F-42B5-8137-9DF3F51BA10A}">
+      <p15:sldGuideLst xmlns:p15="http://schemas.microsoft.com/office/powerpoint/2012/main">
+        <p15:guide id="1" orient="horz" pos="2160">
+          <p15:clr>
+            <a:srgbClr val="A4A3A4"/>
+          </p15:clr>
+        </p15:guide>
+        <p15:guide id="2" pos="2880">
+          <p15:clr>
+            <a:srgbClr val="A4A3A4"/>
+          </p15:clr>
+        </p15:guide>
+      </p15:sldGuideLst>
+    </p:ext>
+  </p:extLst>
 </p:presentation>
 </file>
 
@@ -209,7 +227,7 @@
           <a:p>
             <a:fld id="{F42A8115-F909-4BD7-92C8-BF31BA070AB9}" type="datetimeFigureOut">
               <a:rPr lang="de-CH" smtClean="0"/>
-              <a:t>10.01.2014</a:t>
+              <a:t>11.01.2014</a:t>
             </a:fld>
             <a:endParaRPr lang="de-CH"/>
           </a:p>
@@ -368,7 +386,7 @@
           <a:p>
             <a:fld id="{B8552C9E-37DA-4965-A8A0-AA9C20C3E2D9}" type="slidenum">
               <a:rPr lang="de-CH" smtClean="0"/>
-              <a:t>‹Nr.›</a:t>
+              <a:t>‹#›</a:t>
             </a:fld>
             <a:endParaRPr lang="de-CH"/>
           </a:p>
@@ -2107,7 +2125,7 @@
           <a:p>
             <a:fld id="{6FAC6EEE-FE3A-4B7F-856A-83697D8C29E8}" type="datetimeFigureOut">
               <a:rPr lang="de-CH" smtClean="0"/>
-              <a:t>10.01.2014</a:t>
+              <a:t>11.01.2014</a:t>
             </a:fld>
             <a:endParaRPr lang="de-CH"/>
           </a:p>
@@ -2151,7 +2169,7 @@
           <a:p>
             <a:fld id="{2495AE97-9321-4CC0-B0D8-307E6411C281}" type="slidenum">
               <a:rPr lang="de-CH" smtClean="0"/>
-              <a:t>‹Nr.›</a:t>
+              <a:t>‹#›</a:t>
             </a:fld>
             <a:endParaRPr lang="de-CH"/>
           </a:p>
@@ -3212,7 +3230,7 @@
           <a:p>
             <a:fld id="{6FAC6EEE-FE3A-4B7F-856A-83697D8C29E8}" type="datetimeFigureOut">
               <a:rPr lang="de-CH" smtClean="0"/>
-              <a:t>10.01.2014</a:t>
+              <a:t>11.01.2014</a:t>
             </a:fld>
             <a:endParaRPr lang="de-CH"/>
           </a:p>
@@ -3254,7 +3272,7 @@
           <a:p>
             <a:fld id="{2495AE97-9321-4CC0-B0D8-307E6411C281}" type="slidenum">
               <a:rPr lang="de-CH" smtClean="0"/>
-              <a:t>‹Nr.›</a:t>
+              <a:t>‹#›</a:t>
             </a:fld>
             <a:endParaRPr lang="de-CH"/>
           </a:p>
@@ -4325,7 +4343,7 @@
           <a:p>
             <a:fld id="{6FAC6EEE-FE3A-4B7F-856A-83697D8C29E8}" type="datetimeFigureOut">
               <a:rPr lang="de-CH" smtClean="0"/>
-              <a:t>10.01.2014</a:t>
+              <a:t>11.01.2014</a:t>
             </a:fld>
             <a:endParaRPr lang="de-CH"/>
           </a:p>
@@ -4367,7 +4385,7 @@
           <a:p>
             <a:fld id="{2495AE97-9321-4CC0-B0D8-307E6411C281}" type="slidenum">
               <a:rPr lang="de-CH" smtClean="0"/>
-              <a:t>‹Nr.›</a:t>
+              <a:t>‹#›</a:t>
             </a:fld>
             <a:endParaRPr lang="de-CH"/>
           </a:p>
@@ -5433,7 +5451,7 @@
           <a:p>
             <a:fld id="{6FAC6EEE-FE3A-4B7F-856A-83697D8C29E8}" type="datetimeFigureOut">
               <a:rPr lang="de-CH" smtClean="0"/>
-              <a:t>10.01.2014</a:t>
+              <a:t>11.01.2014</a:t>
             </a:fld>
             <a:endParaRPr lang="de-CH"/>
           </a:p>
@@ -5475,7 +5493,7 @@
           <a:p>
             <a:fld id="{2495AE97-9321-4CC0-B0D8-307E6411C281}" type="slidenum">
               <a:rPr lang="de-CH" smtClean="0"/>
-              <a:t>‹Nr.›</a:t>
+              <a:t>‹#›</a:t>
             </a:fld>
             <a:endParaRPr lang="de-CH"/>
           </a:p>
@@ -7026,7 +7044,7 @@
           <a:p>
             <a:fld id="{6FAC6EEE-FE3A-4B7F-856A-83697D8C29E8}" type="datetimeFigureOut">
               <a:rPr lang="de-CH" smtClean="0"/>
-              <a:t>10.01.2014</a:t>
+              <a:t>11.01.2014</a:t>
             </a:fld>
             <a:endParaRPr lang="de-CH"/>
           </a:p>
@@ -7068,7 +7086,7 @@
           <a:p>
             <a:fld id="{2495AE97-9321-4CC0-B0D8-307E6411C281}" type="slidenum">
               <a:rPr lang="de-CH" smtClean="0"/>
-              <a:t>‹Nr.›</a:t>
+              <a:t>‹#›</a:t>
             </a:fld>
             <a:endParaRPr lang="de-CH"/>
           </a:p>
@@ -8084,7 +8102,7 @@
           <a:p>
             <a:fld id="{6FAC6EEE-FE3A-4B7F-856A-83697D8C29E8}" type="datetimeFigureOut">
               <a:rPr lang="de-CH" smtClean="0"/>
-              <a:t>10.01.2014</a:t>
+              <a:t>11.01.2014</a:t>
             </a:fld>
             <a:endParaRPr lang="de-CH"/>
           </a:p>
@@ -8126,7 +8144,7 @@
           <a:p>
             <a:fld id="{2495AE97-9321-4CC0-B0D8-307E6411C281}" type="slidenum">
               <a:rPr lang="de-CH" smtClean="0"/>
-              <a:t>‹Nr.›</a:t>
+              <a:t>‹#›</a:t>
             </a:fld>
             <a:endParaRPr lang="de-CH"/>
           </a:p>
@@ -9411,7 +9429,7 @@
           <a:p>
             <a:fld id="{6FAC6EEE-FE3A-4B7F-856A-83697D8C29E8}" type="datetimeFigureOut">
               <a:rPr lang="de-CH" smtClean="0"/>
-              <a:t>10.01.2014</a:t>
+              <a:t>11.01.2014</a:t>
             </a:fld>
             <a:endParaRPr lang="de-CH"/>
           </a:p>
@@ -9453,7 +9471,7 @@
           <a:p>
             <a:fld id="{2495AE97-9321-4CC0-B0D8-307E6411C281}" type="slidenum">
               <a:rPr lang="de-CH" smtClean="0"/>
-              <a:t>‹Nr.›</a:t>
+              <a:t>‹#›</a:t>
             </a:fld>
             <a:endParaRPr lang="de-CH"/>
           </a:p>
@@ -10548,7 +10566,7 @@
           <a:p>
             <a:fld id="{6FAC6EEE-FE3A-4B7F-856A-83697D8C29E8}" type="datetimeFigureOut">
               <a:rPr lang="de-CH" smtClean="0"/>
-              <a:t>10.01.2014</a:t>
+              <a:t>11.01.2014</a:t>
             </a:fld>
             <a:endParaRPr lang="de-CH"/>
           </a:p>
@@ -10590,7 +10608,7 @@
           <a:p>
             <a:fld id="{2495AE97-9321-4CC0-B0D8-307E6411C281}" type="slidenum">
               <a:rPr lang="de-CH" smtClean="0"/>
-              <a:t>‹Nr.›</a:t>
+              <a:t>‹#›</a:t>
             </a:fld>
             <a:endParaRPr lang="de-CH"/>
           </a:p>
@@ -11604,7 +11622,7 @@
           <a:p>
             <a:fld id="{6FAC6EEE-FE3A-4B7F-856A-83697D8C29E8}" type="datetimeFigureOut">
               <a:rPr lang="de-CH" smtClean="0"/>
-              <a:t>10.01.2014</a:t>
+              <a:t>11.01.2014</a:t>
             </a:fld>
             <a:endParaRPr lang="de-CH"/>
           </a:p>
@@ -11646,7 +11664,7 @@
           <a:p>
             <a:fld id="{2495AE97-9321-4CC0-B0D8-307E6411C281}" type="slidenum">
               <a:rPr lang="de-CH" smtClean="0"/>
-              <a:t>‹Nr.›</a:t>
+              <a:t>‹#›</a:t>
             </a:fld>
             <a:endParaRPr lang="de-CH"/>
           </a:p>
@@ -12642,7 +12660,7 @@
           <a:p>
             <a:fld id="{6FAC6EEE-FE3A-4B7F-856A-83697D8C29E8}" type="datetimeFigureOut">
               <a:rPr lang="de-CH" smtClean="0"/>
-              <a:t>10.01.2014</a:t>
+              <a:t>11.01.2014</a:t>
             </a:fld>
             <a:endParaRPr lang="de-CH"/>
           </a:p>
@@ -12684,7 +12702,7 @@
           <a:p>
             <a:fld id="{2495AE97-9321-4CC0-B0D8-307E6411C281}" type="slidenum">
               <a:rPr lang="de-CH" smtClean="0"/>
-              <a:t>‹Nr.›</a:t>
+              <a:t>‹#›</a:t>
             </a:fld>
             <a:endParaRPr lang="de-CH"/>
           </a:p>
@@ -13877,7 +13895,7 @@
           <a:p>
             <a:fld id="{6FAC6EEE-FE3A-4B7F-856A-83697D8C29E8}" type="datetimeFigureOut">
               <a:rPr lang="de-CH" smtClean="0"/>
-              <a:t>10.01.2014</a:t>
+              <a:t>11.01.2014</a:t>
             </a:fld>
             <a:endParaRPr lang="de-CH"/>
           </a:p>
@@ -13919,7 +13937,7 @@
           <a:p>
             <a:fld id="{2495AE97-9321-4CC0-B0D8-307E6411C281}" type="slidenum">
               <a:rPr lang="de-CH" smtClean="0"/>
-              <a:t>‹Nr.›</a:t>
+              <a:t>‹#›</a:t>
             </a:fld>
             <a:endParaRPr lang="de-CH"/>
           </a:p>
@@ -14230,7 +14248,7 @@
           <a:p>
             <a:fld id="{6FAC6EEE-FE3A-4B7F-856A-83697D8C29E8}" type="datetimeFigureOut">
               <a:rPr lang="de-CH" smtClean="0"/>
-              <a:t>10.01.2014</a:t>
+              <a:t>11.01.2014</a:t>
             </a:fld>
             <a:endParaRPr lang="de-CH"/>
           </a:p>
@@ -14304,7 +14322,7 @@
           <a:p>
             <a:fld id="{2495AE97-9321-4CC0-B0D8-307E6411C281}" type="slidenum">
               <a:rPr lang="de-CH" smtClean="0"/>
-              <a:t>‹Nr.›</a:t>
+              <a:t>‹#›</a:t>
             </a:fld>
             <a:endParaRPr lang="de-CH"/>
           </a:p>
@@ -14773,11 +14791,11 @@
   <p:clrMapOvr>
     <a:masterClrMapping/>
   </p:clrMapOvr>
-  <mc:AlternateContent xmlns:mc="http://schemas.openxmlformats.org/markup-compatibility/2006">
-    <mc:Choice xmlns:p14="http://schemas.microsoft.com/office/powerpoint/2010/main" Requires="p14">
+  <mc:AlternateContent xmlns:mc="http://schemas.openxmlformats.org/markup-compatibility/2006" xmlns:p14="http://schemas.microsoft.com/office/powerpoint/2010/main">
+    <mc:Choice Requires="p14">
       <p:transition spd="slow" p14:dur="2000"/>
     </mc:Choice>
-    <mc:Fallback>
+    <mc:Fallback xmlns="">
       <p:transition spd="slow"/>
     </mc:Fallback>
   </mc:AlternateContent>
@@ -14831,29 +14849,35 @@
           </a:p>
         </p:txBody>
       </p:sp>
-      <p:sp>
-        <p:nvSpPr>
-          <p:cNvPr id="4" name="Inhaltsplatzhalter 3"/>
-          <p:cNvSpPr>
-            <a:spLocks noGrp="1"/>
-          </p:cNvSpPr>
+      <p:pic>
+        <p:nvPicPr>
+          <p:cNvPr id="3" name="Content Placeholder 2"/>
+          <p:cNvPicPr>
+            <a:picLocks noGrp="1" noChangeAspect="1"/>
+          </p:cNvPicPr>
           <p:nvPr>
             <p:ph idx="1"/>
           </p:nvPr>
-        </p:nvSpPr>
-        <p:spPr/>
-        <p:txBody>
-          <a:bodyPr/>
-          <a:lstStyle/>
-          <a:p>
-            <a:r>
-              <a:rPr lang="de-CH" dirty="0" smtClean="0"/>
-              <a:t>Bild</a:t>
-            </a:r>
-            <a:endParaRPr lang="de-CH" dirty="0"/>
-          </a:p>
-        </p:txBody>
-      </p:sp>
+        </p:nvPicPr>
+        <p:blipFill>
+          <a:blip r:embed="rId2">
+            <a:extLst>
+              <a:ext uri="{28A0092B-C50C-407E-A947-70E740481C1C}">
+                <a14:useLocalDpi xmlns:a14="http://schemas.microsoft.com/office/drawing/2010/main" val="0"/>
+              </a:ext>
+            </a:extLst>
+          </a:blip>
+          <a:stretch>
+            <a:fillRect/>
+          </a:stretch>
+        </p:blipFill>
+        <p:spPr>
+          <a:xfrm>
+            <a:off x="2705100" y="1600200"/>
+            <a:ext cx="3733800" cy="3733800"/>
+          </a:xfrm>
+        </p:spPr>
+      </p:pic>
     </p:spTree>
     <p:extLst>
       <p:ext uri="{BB962C8B-B14F-4D97-AF65-F5344CB8AC3E}">
@@ -14970,6 +14994,18 @@
               <a:rPr lang="de-CH" dirty="0" smtClean="0"/>
               <a:t>Wellenausbreitung</a:t>
             </a:r>
+          </a:p>
+          <a:p>
+            <a:pPr lvl="1"/>
+            <a:r>
+              <a:rPr lang="de-CH" dirty="0"/>
+              <a:t>Drehung der Karte ( verworfen </a:t>
+            </a:r>
+            <a:r>
+              <a:rPr lang="de-CH" dirty="0" smtClean="0"/>
+              <a:t>)</a:t>
+            </a:r>
+            <a:endParaRPr lang="de-CH" dirty="0" smtClean="0"/>
           </a:p>
           <a:p>
             <a:pPr lvl="1"/>
@@ -15063,6 +15099,36 @@
           </a:p>
         </p:txBody>
       </p:sp>
+      <p:pic>
+        <p:nvPicPr>
+          <p:cNvPr id="3" name="Picture 2"/>
+          <p:cNvPicPr>
+            <a:picLocks noChangeAspect="1"/>
+          </p:cNvPicPr>
+          <p:nvPr/>
+        </p:nvPicPr>
+        <p:blipFill>
+          <a:blip r:embed="rId2">
+            <a:extLst>
+              <a:ext uri="{28A0092B-C50C-407E-A947-70E740481C1C}">
+                <a14:useLocalDpi xmlns:a14="http://schemas.microsoft.com/office/drawing/2010/main" val="0"/>
+              </a:ext>
+            </a:extLst>
+          </a:blip>
+          <a:stretch>
+            <a:fillRect/>
+          </a:stretch>
+        </p:blipFill>
+        <p:spPr>
+          <a:xfrm>
+            <a:off x="766231" y="575864"/>
+            <a:ext cx="7611537" cy="5706271"/>
+          </a:xfrm>
+          <a:prstGeom prst="rect">
+            <a:avLst/>
+          </a:prstGeom>
+        </p:spPr>
+      </p:pic>
     </p:spTree>
     <p:extLst>
       <p:ext uri="{BB962C8B-B14F-4D97-AF65-F5344CB8AC3E}">
@@ -15135,92 +15201,51 @@
         </p:nvSpPr>
         <p:spPr/>
         <p:txBody>
-          <a:bodyPr>
-            <a:normAutofit fontScale="92500" lnSpcReduction="10000"/>
-          </a:bodyPr>
+          <a:bodyPr/>
           <a:lstStyle/>
           <a:p>
             <a:r>
               <a:rPr lang="de-CH" dirty="0" smtClean="0"/>
-              <a:t>Bedingungen</a:t>
-            </a:r>
-          </a:p>
-          <a:p>
-            <a:pPr lvl="1"/>
-            <a:r>
-              <a:rPr lang="de-CH" dirty="0" smtClean="0"/>
-              <a:t>180° Blickwinkel ( + / - 90 ° )</a:t>
-            </a:r>
-          </a:p>
-          <a:p>
-            <a:pPr lvl="1"/>
-            <a:r>
-              <a:rPr lang="de-CH" dirty="0" smtClean="0"/>
-              <a:t>∞ Sichtweite </a:t>
-            </a:r>
-          </a:p>
-          <a:p>
-            <a:pPr lvl="1"/>
-            <a:r>
-              <a:rPr lang="de-CH" dirty="0" smtClean="0"/>
-              <a:t>Obstruktion durch Elemente</a:t>
-            </a:r>
-          </a:p>
-          <a:p>
-            <a:pPr lvl="1"/>
-            <a:endParaRPr lang="de-CH" dirty="0"/>
-          </a:p>
-          <a:p>
-            <a:r>
-              <a:rPr lang="de-CH" dirty="0" smtClean="0"/>
-              <a:t>Lösung durch</a:t>
-            </a:r>
-          </a:p>
-          <a:p>
-            <a:pPr lvl="1"/>
-            <a:r>
-              <a:rPr lang="de-CH" dirty="0" smtClean="0"/>
-              <a:t>Wellenausbreitung</a:t>
-            </a:r>
-          </a:p>
-          <a:p>
-            <a:pPr lvl="1"/>
-            <a:r>
-              <a:rPr lang="de-CH" dirty="0" smtClean="0"/>
-              <a:t>Schattenschlagen</a:t>
-            </a:r>
-          </a:p>
-          <a:p>
-            <a:pPr lvl="1"/>
-            <a:r>
-              <a:rPr lang="de-CH" dirty="0" smtClean="0"/>
-              <a:t>Drehung der Karte ( verworfen )</a:t>
-            </a:r>
-          </a:p>
-          <a:p>
-            <a:pPr lvl="1"/>
-            <a:r>
-              <a:rPr lang="de-CH" dirty="0" smtClean="0"/>
-              <a:t>Verwaltung der erkundeten Karte</a:t>
-            </a:r>
-          </a:p>
-          <a:p>
-            <a:pPr lvl="1"/>
-            <a:endParaRPr lang="de-CH" dirty="0" smtClean="0"/>
-          </a:p>
-          <a:p>
-            <a:r>
-              <a:rPr lang="de-CH" dirty="0" smtClean="0"/>
-              <a:t>Demo : Erste Abtastung</a:t>
+              <a:t>Bilder</a:t>
             </a:r>
             <a:endParaRPr lang="de-CH" dirty="0"/>
           </a:p>
         </p:txBody>
       </p:sp>
+      <p:pic>
+        <p:nvPicPr>
+          <p:cNvPr id="5" name="Picture 4"/>
+          <p:cNvPicPr>
+            <a:picLocks noChangeAspect="1"/>
+          </p:cNvPicPr>
+          <p:nvPr/>
+        </p:nvPicPr>
+        <p:blipFill>
+          <a:blip r:embed="rId2">
+            <a:extLst>
+              <a:ext uri="{28A0092B-C50C-407E-A947-70E740481C1C}">
+                <a14:useLocalDpi xmlns:a14="http://schemas.microsoft.com/office/drawing/2010/main" val="0"/>
+              </a:ext>
+            </a:extLst>
+          </a:blip>
+          <a:stretch>
+            <a:fillRect/>
+          </a:stretch>
+        </p:blipFill>
+        <p:spPr>
+          <a:xfrm>
+            <a:off x="766231" y="575864"/>
+            <a:ext cx="7611537" cy="5706271"/>
+          </a:xfrm>
+          <a:prstGeom prst="rect">
+            <a:avLst/>
+          </a:prstGeom>
+        </p:spPr>
+      </p:pic>
     </p:spTree>
     <p:extLst>
       <p:ext uri="{BB962C8B-B14F-4D97-AF65-F5344CB8AC3E}">
-        <p14:creationId xmlns:p14="http://schemas.microsoft.com/office/powerpoint/2010/main" val="4012203953"/>
+        <p14:creationId xmlns:p14="http://schemas.microsoft.com/office/powerpoint/2010/main" val="946459124"/>
       </p:ext>
     </p:extLst>
   </p:cSld>
@@ -15270,8 +15295,8 @@
           <a:lstStyle/>
           <a:p>
             <a:r>
-              <a:rPr lang="de-CH" dirty="0" err="1" smtClean="0"/>
-              <a:t>MiniMap</a:t>
+              <a:rPr lang="de-CH" dirty="0" smtClean="0"/>
+              <a:t>Entdeckung</a:t>
             </a:r>
             <a:endParaRPr lang="de-CH" dirty="0"/>
           </a:p>
@@ -15294,37 +15319,46 @@
           <a:p>
             <a:r>
               <a:rPr lang="de-CH" dirty="0" smtClean="0"/>
-              <a:t>Abbildung der erkundeten Karte</a:t>
-            </a:r>
-          </a:p>
-          <a:p>
-            <a:pPr lvl="1"/>
-            <a:r>
-              <a:rPr lang="de-CH" dirty="0" smtClean="0"/>
-              <a:t>Hindernisse</a:t>
-            </a:r>
-          </a:p>
-          <a:p>
-            <a:pPr lvl="1"/>
-            <a:r>
-              <a:rPr lang="de-CH" dirty="0" smtClean="0"/>
-              <a:t>Gesehene und ungesehene Bereiche</a:t>
-            </a:r>
-          </a:p>
-          <a:p>
-            <a:pPr lvl="1"/>
-            <a:r>
-              <a:rPr lang="de-CH" dirty="0" smtClean="0"/>
-              <a:t>Geplanter Pfad</a:t>
+              <a:t>Bilder</a:t>
             </a:r>
             <a:endParaRPr lang="de-CH" dirty="0"/>
           </a:p>
         </p:txBody>
       </p:sp>
+      <p:pic>
+        <p:nvPicPr>
+          <p:cNvPr id="5" name="Picture 4"/>
+          <p:cNvPicPr>
+            <a:picLocks noChangeAspect="1"/>
+          </p:cNvPicPr>
+          <p:nvPr/>
+        </p:nvPicPr>
+        <p:blipFill>
+          <a:blip r:embed="rId2">
+            <a:extLst>
+              <a:ext uri="{28A0092B-C50C-407E-A947-70E740481C1C}">
+                <a14:useLocalDpi xmlns:a14="http://schemas.microsoft.com/office/drawing/2010/main" val="0"/>
+              </a:ext>
+            </a:extLst>
+          </a:blip>
+          <a:stretch>
+            <a:fillRect/>
+          </a:stretch>
+        </p:blipFill>
+        <p:spPr>
+          <a:xfrm>
+            <a:off x="766231" y="575864"/>
+            <a:ext cx="7611537" cy="5706271"/>
+          </a:xfrm>
+          <a:prstGeom prst="rect">
+            <a:avLst/>
+          </a:prstGeom>
+        </p:spPr>
+      </p:pic>
     </p:spTree>
     <p:extLst>
       <p:ext uri="{BB962C8B-B14F-4D97-AF65-F5344CB8AC3E}">
-        <p14:creationId xmlns:p14="http://schemas.microsoft.com/office/powerpoint/2010/main" val="1658181190"/>
+        <p14:creationId xmlns:p14="http://schemas.microsoft.com/office/powerpoint/2010/main" val="3368348322"/>
       </p:ext>
     </p:extLst>
   </p:cSld>
@@ -15374,8 +15408,8 @@
           <a:lstStyle/>
           <a:p>
             <a:r>
-              <a:rPr lang="de-CH" dirty="0" err="1" smtClean="0"/>
-              <a:t>PFadfindung</a:t>
+              <a:rPr lang="de-CH" dirty="0" smtClean="0"/>
+              <a:t>Entdeckung</a:t>
             </a:r>
             <a:endParaRPr lang="de-CH" dirty="0"/>
           </a:p>
@@ -15394,31 +15428,34 @@
         <p:spPr/>
         <p:txBody>
           <a:bodyPr>
-            <a:normAutofit fontScale="92500" lnSpcReduction="20000"/>
+            <a:normAutofit fontScale="92500" lnSpcReduction="10000"/>
           </a:bodyPr>
           <a:lstStyle/>
           <a:p>
             <a:r>
               <a:rPr lang="de-CH" dirty="0" smtClean="0"/>
-              <a:t>Idee</a:t>
+              <a:t>Bedingungen</a:t>
             </a:r>
           </a:p>
           <a:p>
             <a:pPr lvl="1"/>
             <a:r>
               <a:rPr lang="de-CH" dirty="0" smtClean="0"/>
-              <a:t>Bereich Erkundung (verworfen)</a:t>
+              <a:t>180° Blickwinkel ( + / - 90 ° )</a:t>
             </a:r>
           </a:p>
           <a:p>
             <a:pPr lvl="1"/>
             <a:r>
-              <a:rPr lang="de-CH" dirty="0"/>
-              <a:t>Kanten </a:t>
-            </a:r>
-            <a:r>
               <a:rPr lang="de-CH" dirty="0" smtClean="0"/>
-              <a:t>der Schatten</a:t>
+              <a:t>∞ Sichtweite </a:t>
+            </a:r>
+          </a:p>
+          <a:p>
+            <a:pPr lvl="1"/>
+            <a:r>
+              <a:rPr lang="de-CH" dirty="0" smtClean="0"/>
+              <a:t>Obstruktion durch Elemente</a:t>
             </a:r>
           </a:p>
           <a:p>
@@ -15428,59 +15465,44 @@
           <a:p>
             <a:r>
               <a:rPr lang="de-CH" dirty="0" smtClean="0"/>
-              <a:t>Dijkstra</a:t>
+              <a:t>Lösung durch</a:t>
             </a:r>
           </a:p>
           <a:p>
             <a:pPr lvl="1"/>
             <a:r>
               <a:rPr lang="de-CH" dirty="0" smtClean="0"/>
-              <a:t>Rasterung der Karte</a:t>
+              <a:t>Wellenausbreitung</a:t>
             </a:r>
           </a:p>
           <a:p>
             <a:pPr lvl="1"/>
             <a:r>
+              <a:rPr lang="de-CH" dirty="0"/>
+              <a:t>Drehung der Karte ( verworfen </a:t>
+            </a:r>
+            <a:r>
               <a:rPr lang="de-CH" dirty="0" smtClean="0"/>
-              <a:t>Sicherstellung Bewegung Roboter</a:t>
-            </a:r>
+              <a:t>)</a:t>
+            </a:r>
+            <a:endParaRPr lang="de-CH" dirty="0" smtClean="0"/>
           </a:p>
           <a:p>
             <a:pPr lvl="1"/>
             <a:r>
               <a:rPr lang="de-CH" dirty="0" smtClean="0"/>
-              <a:t>Leistung</a:t>
+              <a:t>Schattenschlagen</a:t>
             </a:r>
           </a:p>
           <a:p>
             <a:pPr lvl="1"/>
-            <a:endParaRPr lang="de-CH" dirty="0"/>
-          </a:p>
-          <a:p>
             <a:r>
               <a:rPr lang="de-CH" dirty="0" smtClean="0"/>
-              <a:t>Kollision</a:t>
-            </a:r>
-          </a:p>
-          <a:p>
-            <a:pPr lvl="1"/>
+              <a:t>Verwaltung </a:t>
+            </a:r>
             <a:r>
               <a:rPr lang="de-CH" dirty="0" smtClean="0"/>
-              <a:t>Akzeptiert, wäre verhinderbar</a:t>
-            </a:r>
-          </a:p>
-          <a:p>
-            <a:pPr lvl="1"/>
-            <a:r>
-              <a:rPr lang="de-CH" dirty="0" smtClean="0"/>
-              <a:t>Neuorientierung</a:t>
-            </a:r>
-          </a:p>
-          <a:p>
-            <a:pPr lvl="1"/>
-            <a:r>
-              <a:rPr lang="de-CH" dirty="0" smtClean="0"/>
-              <a:t>Karteneditor Funktionalität</a:t>
+              <a:t>der erkundeten Karte</a:t>
             </a:r>
           </a:p>
           <a:p>
@@ -15488,7 +15510,10 @@
             <a:endParaRPr lang="de-CH" dirty="0" smtClean="0"/>
           </a:p>
           <a:p>
-            <a:pPr lvl="1"/>
+            <a:r>
+              <a:rPr lang="de-CH" dirty="0" smtClean="0"/>
+              <a:t>Demo : Erste Abtastung</a:t>
+            </a:r>
             <a:endParaRPr lang="de-CH" dirty="0"/>
           </a:p>
         </p:txBody>
@@ -15496,7 +15521,7 @@
     </p:spTree>
     <p:extLst>
       <p:ext uri="{BB962C8B-B14F-4D97-AF65-F5344CB8AC3E}">
-        <p14:creationId xmlns:p14="http://schemas.microsoft.com/office/powerpoint/2010/main" val="3218278485"/>
+        <p14:creationId xmlns:p14="http://schemas.microsoft.com/office/powerpoint/2010/main" val="4012203953"/>
       </p:ext>
     </p:extLst>
   </p:cSld>
@@ -15542,8 +15567,284 @@
         </p:nvSpPr>
         <p:spPr/>
         <p:txBody>
+          <a:bodyPr/>
+          <a:lstStyle/>
+          <a:p>
+            <a:r>
+              <a:rPr lang="de-CH" dirty="0" err="1" smtClean="0"/>
+              <a:t>MiniMap</a:t>
+            </a:r>
+            <a:endParaRPr lang="de-CH" dirty="0"/>
+          </a:p>
+        </p:txBody>
+      </p:sp>
+      <p:sp>
+        <p:nvSpPr>
+          <p:cNvPr id="4" name="Inhaltsplatzhalter 3"/>
+          <p:cNvSpPr>
+            <a:spLocks noGrp="1"/>
+          </p:cNvSpPr>
+          <p:nvPr>
+            <p:ph idx="1"/>
+          </p:nvPr>
+        </p:nvSpPr>
+        <p:spPr/>
+        <p:txBody>
+          <a:bodyPr/>
+          <a:lstStyle/>
+          <a:p>
+            <a:r>
+              <a:rPr lang="de-CH" dirty="0" smtClean="0"/>
+              <a:t>Abbildung der erkundeten Karte</a:t>
+            </a:r>
+          </a:p>
+          <a:p>
+            <a:pPr lvl="1"/>
+            <a:r>
+              <a:rPr lang="de-CH" dirty="0" smtClean="0"/>
+              <a:t>Hindernisse</a:t>
+            </a:r>
+          </a:p>
+          <a:p>
+            <a:pPr lvl="1"/>
+            <a:r>
+              <a:rPr lang="de-CH" dirty="0" smtClean="0"/>
+              <a:t>Gesehene und ungesehene Bereiche</a:t>
+            </a:r>
+          </a:p>
+          <a:p>
+            <a:pPr lvl="1"/>
+            <a:r>
+              <a:rPr lang="de-CH" dirty="0" smtClean="0"/>
+              <a:t>Geplanter Pfad</a:t>
+            </a:r>
+            <a:endParaRPr lang="de-CH" dirty="0"/>
+          </a:p>
+        </p:txBody>
+      </p:sp>
+    </p:spTree>
+    <p:extLst>
+      <p:ext uri="{BB962C8B-B14F-4D97-AF65-F5344CB8AC3E}">
+        <p14:creationId xmlns:p14="http://schemas.microsoft.com/office/powerpoint/2010/main" val="1658181190"/>
+      </p:ext>
+    </p:extLst>
+  </p:cSld>
+  <p:clrMapOvr>
+    <a:masterClrMapping/>
+  </p:clrMapOvr>
+  <p:timing>
+    <p:tnLst>
+      <p:par>
+        <p:cTn id="1" dur="indefinite" restart="never" nodeType="tmRoot"/>
+      </p:par>
+    </p:tnLst>
+  </p:timing>
+</p:sld>
+</file>
+
+<file path=ppt/slides/slide17.xml><?xml version="1.0" encoding="utf-8"?>
+<p:sld xmlns:a="http://schemas.openxmlformats.org/drawingml/2006/main" xmlns:r="http://schemas.openxmlformats.org/officeDocument/2006/relationships" xmlns:p="http://schemas.openxmlformats.org/presentationml/2006/main">
+  <p:cSld>
+    <p:spTree>
+      <p:nvGrpSpPr>
+        <p:cNvPr id="1" name=""/>
+        <p:cNvGrpSpPr/>
+        <p:nvPr/>
+      </p:nvGrpSpPr>
+      <p:grpSpPr>
+        <a:xfrm>
+          <a:off x="0" y="0"/>
+          <a:ext cx="0" cy="0"/>
+          <a:chOff x="0" y="0"/>
+          <a:chExt cx="0" cy="0"/>
+        </a:xfrm>
+      </p:grpSpPr>
+      <p:sp>
+        <p:nvSpPr>
+          <p:cNvPr id="2" name="Titel 1"/>
+          <p:cNvSpPr>
+            <a:spLocks noGrp="1"/>
+          </p:cNvSpPr>
+          <p:nvPr>
+            <p:ph type="title"/>
+          </p:nvPr>
+        </p:nvSpPr>
+        <p:spPr/>
+        <p:txBody>
+          <a:bodyPr/>
+          <a:lstStyle/>
+          <a:p>
+            <a:r>
+              <a:rPr lang="de-CH" dirty="0" err="1" smtClean="0"/>
+              <a:t>PFadfindung</a:t>
+            </a:r>
+            <a:endParaRPr lang="de-CH" dirty="0"/>
+          </a:p>
+        </p:txBody>
+      </p:sp>
+      <p:sp>
+        <p:nvSpPr>
+          <p:cNvPr id="4" name="Inhaltsplatzhalter 3"/>
+          <p:cNvSpPr>
+            <a:spLocks noGrp="1"/>
+          </p:cNvSpPr>
+          <p:nvPr>
+            <p:ph idx="1"/>
+          </p:nvPr>
+        </p:nvSpPr>
+        <p:spPr/>
+        <p:txBody>
           <a:bodyPr>
-            <a:normAutofit fontScale="90000"/>
+            <a:normAutofit fontScale="92500" lnSpcReduction="20000"/>
+          </a:bodyPr>
+          <a:lstStyle/>
+          <a:p>
+            <a:r>
+              <a:rPr lang="de-CH" dirty="0" smtClean="0"/>
+              <a:t>Idee</a:t>
+            </a:r>
+          </a:p>
+          <a:p>
+            <a:pPr lvl="1"/>
+            <a:r>
+              <a:rPr lang="de-CH" dirty="0" smtClean="0"/>
+              <a:t>Bereich Erkundung (verworfen)</a:t>
+            </a:r>
+          </a:p>
+          <a:p>
+            <a:pPr lvl="1"/>
+            <a:r>
+              <a:rPr lang="de-CH" dirty="0"/>
+              <a:t>Kanten </a:t>
+            </a:r>
+            <a:r>
+              <a:rPr lang="de-CH" dirty="0" smtClean="0"/>
+              <a:t>der Schatten</a:t>
+            </a:r>
+          </a:p>
+          <a:p>
+            <a:pPr lvl="1"/>
+            <a:endParaRPr lang="de-CH" dirty="0"/>
+          </a:p>
+          <a:p>
+            <a:r>
+              <a:rPr lang="de-CH" dirty="0" smtClean="0"/>
+              <a:t>Dijkstra</a:t>
+            </a:r>
+          </a:p>
+          <a:p>
+            <a:pPr lvl="1"/>
+            <a:r>
+              <a:rPr lang="de-CH" dirty="0" smtClean="0"/>
+              <a:t>Rasterung der Karte</a:t>
+            </a:r>
+          </a:p>
+          <a:p>
+            <a:pPr lvl="1"/>
+            <a:r>
+              <a:rPr lang="de-CH" dirty="0" smtClean="0"/>
+              <a:t>Sicherstellung Bewegung Roboter</a:t>
+            </a:r>
+          </a:p>
+          <a:p>
+            <a:pPr lvl="1"/>
+            <a:r>
+              <a:rPr lang="de-CH" dirty="0" smtClean="0"/>
+              <a:t>Leistung</a:t>
+            </a:r>
+          </a:p>
+          <a:p>
+            <a:pPr lvl="1"/>
+            <a:endParaRPr lang="de-CH" dirty="0"/>
+          </a:p>
+          <a:p>
+            <a:r>
+              <a:rPr lang="de-CH" dirty="0" smtClean="0"/>
+              <a:t>Kollision</a:t>
+            </a:r>
+          </a:p>
+          <a:p>
+            <a:pPr lvl="1"/>
+            <a:r>
+              <a:rPr lang="de-CH" dirty="0" smtClean="0"/>
+              <a:t>Akzeptiert, wäre verhinderbar</a:t>
+            </a:r>
+          </a:p>
+          <a:p>
+            <a:pPr lvl="1"/>
+            <a:r>
+              <a:rPr lang="de-CH" dirty="0" smtClean="0"/>
+              <a:t>Neuorientierung</a:t>
+            </a:r>
+          </a:p>
+          <a:p>
+            <a:pPr lvl="1"/>
+            <a:r>
+              <a:rPr lang="de-CH" dirty="0" smtClean="0"/>
+              <a:t>Karteneditor Funktionalität</a:t>
+            </a:r>
+          </a:p>
+          <a:p>
+            <a:pPr lvl="1"/>
+            <a:endParaRPr lang="de-CH" dirty="0" smtClean="0"/>
+          </a:p>
+          <a:p>
+            <a:pPr lvl="1"/>
+            <a:endParaRPr lang="de-CH" dirty="0"/>
+          </a:p>
+        </p:txBody>
+      </p:sp>
+    </p:spTree>
+    <p:extLst>
+      <p:ext uri="{BB962C8B-B14F-4D97-AF65-F5344CB8AC3E}">
+        <p14:creationId xmlns:p14="http://schemas.microsoft.com/office/powerpoint/2010/main" val="3218278485"/>
+      </p:ext>
+    </p:extLst>
+  </p:cSld>
+  <p:clrMapOvr>
+    <a:masterClrMapping/>
+  </p:clrMapOvr>
+  <p:timing>
+    <p:tnLst>
+      <p:par>
+        <p:cTn id="1" dur="indefinite" restart="never" nodeType="tmRoot"/>
+      </p:par>
+    </p:tnLst>
+  </p:timing>
+</p:sld>
+</file>
+
+<file path=ppt/slides/slide18.xml><?xml version="1.0" encoding="utf-8"?>
+<p:sld xmlns:a="http://schemas.openxmlformats.org/drawingml/2006/main" xmlns:r="http://schemas.openxmlformats.org/officeDocument/2006/relationships" xmlns:p="http://schemas.openxmlformats.org/presentationml/2006/main">
+  <p:cSld>
+    <p:spTree>
+      <p:nvGrpSpPr>
+        <p:cNvPr id="1" name=""/>
+        <p:cNvGrpSpPr/>
+        <p:nvPr/>
+      </p:nvGrpSpPr>
+      <p:grpSpPr>
+        <a:xfrm>
+          <a:off x="0" y="0"/>
+          <a:ext cx="0" cy="0"/>
+          <a:chOff x="0" y="0"/>
+          <a:chExt cx="0" cy="0"/>
+        </a:xfrm>
+      </p:grpSpPr>
+      <p:sp>
+        <p:nvSpPr>
+          <p:cNvPr id="2" name="Titel 1"/>
+          <p:cNvSpPr>
+            <a:spLocks noGrp="1"/>
+          </p:cNvSpPr>
+          <p:nvPr>
+            <p:ph type="title"/>
+          </p:nvPr>
+        </p:nvSpPr>
+        <p:spPr/>
+        <p:txBody>
+          <a:bodyPr>
+            <a:normAutofit/>
           </a:bodyPr>
           <a:lstStyle/>
           <a:p>
@@ -15641,7 +15942,7 @@
 </p:sld>
 </file>
 
-<file path=ppt/slides/slide17.xml><?xml version="1.0" encoding="utf-8"?>
+<file path=ppt/slides/slide19.xml><?xml version="1.0" encoding="utf-8"?>
 <p:sld xmlns:a="http://schemas.openxmlformats.org/drawingml/2006/main" xmlns:r="http://schemas.openxmlformats.org/officeDocument/2006/relationships" xmlns:p="http://schemas.openxmlformats.org/presentationml/2006/main">
   <p:cSld>
     <p:spTree>
@@ -15833,139 +16134,6 @@
 </p:sld>
 </file>
 
-<file path=ppt/slides/slide18.xml><?xml version="1.0" encoding="utf-8"?>
-<p:sld xmlns:a="http://schemas.openxmlformats.org/drawingml/2006/main" xmlns:r="http://schemas.openxmlformats.org/officeDocument/2006/relationships" xmlns:p="http://schemas.openxmlformats.org/presentationml/2006/main">
-  <p:cSld>
-    <p:spTree>
-      <p:nvGrpSpPr>
-        <p:cNvPr id="1" name=""/>
-        <p:cNvGrpSpPr/>
-        <p:nvPr/>
-      </p:nvGrpSpPr>
-      <p:grpSpPr>
-        <a:xfrm>
-          <a:off x="0" y="0"/>
-          <a:ext cx="0" cy="0"/>
-          <a:chOff x="0" y="0"/>
-          <a:chExt cx="0" cy="0"/>
-        </a:xfrm>
-      </p:grpSpPr>
-      <p:sp>
-        <p:nvSpPr>
-          <p:cNvPr id="2" name="Titel 1"/>
-          <p:cNvSpPr>
-            <a:spLocks noGrp="1"/>
-          </p:cNvSpPr>
-          <p:nvPr>
-            <p:ph type="title"/>
-          </p:nvPr>
-        </p:nvSpPr>
-        <p:spPr/>
-        <p:txBody>
-          <a:bodyPr>
-            <a:normAutofit/>
-          </a:bodyPr>
-          <a:lstStyle/>
-          <a:p>
-            <a:r>
-              <a:rPr lang="de-CH" dirty="0" err="1" smtClean="0"/>
-              <a:t>FAzit</a:t>
-            </a:r>
-            <a:endParaRPr lang="de-CH" dirty="0"/>
-          </a:p>
-        </p:txBody>
-      </p:sp>
-      <p:sp>
-        <p:nvSpPr>
-          <p:cNvPr id="4" name="Inhaltsplatzhalter 3"/>
-          <p:cNvSpPr>
-            <a:spLocks noGrp="1"/>
-          </p:cNvSpPr>
-          <p:nvPr>
-            <p:ph idx="1"/>
-          </p:nvPr>
-        </p:nvSpPr>
-        <p:spPr/>
-        <p:txBody>
-          <a:bodyPr>
-            <a:normAutofit/>
-          </a:bodyPr>
-          <a:lstStyle/>
-          <a:p>
-            <a:r>
-              <a:rPr lang="de-CH" dirty="0" smtClean="0"/>
-              <a:t>Herausforderndes Projekt</a:t>
-            </a:r>
-          </a:p>
-          <a:p>
-            <a:pPr lvl="1"/>
-            <a:r>
-              <a:rPr lang="de-CH" dirty="0" smtClean="0"/>
-              <a:t>Sehr befriedigendes Ergebnis</a:t>
-            </a:r>
-          </a:p>
-          <a:p>
-            <a:endParaRPr lang="de-CH" dirty="0" smtClean="0"/>
-          </a:p>
-          <a:p>
-            <a:r>
-              <a:rPr lang="de-CH" dirty="0" smtClean="0"/>
-              <a:t>Zusammenarbeit</a:t>
-            </a:r>
-          </a:p>
-          <a:p>
-            <a:pPr lvl="1"/>
-            <a:r>
-              <a:rPr lang="de-CH" dirty="0" smtClean="0"/>
-              <a:t>Grossartig</a:t>
-            </a:r>
-          </a:p>
-          <a:p>
-            <a:pPr lvl="1"/>
-            <a:endParaRPr lang="de-CH" dirty="0"/>
-          </a:p>
-          <a:p>
-            <a:r>
-              <a:rPr lang="de-CH" dirty="0" smtClean="0"/>
-              <a:t>Sackgassen aufgetreten ohne bedeutenden Einfluss auf die Zeitplanung.</a:t>
-            </a:r>
-          </a:p>
-          <a:p>
-            <a:endParaRPr lang="de-CH" dirty="0"/>
-          </a:p>
-          <a:p>
-            <a:r>
-              <a:rPr lang="de-CH" dirty="0" smtClean="0"/>
-              <a:t>Grosse Daten (Karte</a:t>
-            </a:r>
-            <a:r>
-              <a:rPr lang="de-CH" smtClean="0"/>
-              <a:t>) erschwerte die Fehlersuche</a:t>
-            </a:r>
-            <a:endParaRPr lang="de-CH" dirty="0"/>
-          </a:p>
-        </p:txBody>
-      </p:sp>
-    </p:spTree>
-    <p:extLst>
-      <p:ext uri="{BB962C8B-B14F-4D97-AF65-F5344CB8AC3E}">
-        <p14:creationId xmlns:p14="http://schemas.microsoft.com/office/powerpoint/2010/main" val="3995877694"/>
-      </p:ext>
-    </p:extLst>
-  </p:cSld>
-  <p:clrMapOvr>
-    <a:masterClrMapping/>
-  </p:clrMapOvr>
-  <p:timing>
-    <p:tnLst>
-      <p:par>
-        <p:cTn id="1" dur="indefinite" restart="never" nodeType="tmRoot"/>
-      </p:par>
-    </p:tnLst>
-  </p:timing>
-</p:sld>
-</file>
-
 <file path=ppt/slides/slide2.xml><?xml version="1.0" encoding="utf-8"?>
 <p:sld xmlns:a="http://schemas.openxmlformats.org/drawingml/2006/main" xmlns:r="http://schemas.openxmlformats.org/officeDocument/2006/relationships" xmlns:p="http://schemas.openxmlformats.org/presentationml/2006/main">
   <p:cSld>
@@ -16138,6 +16306,139 @@
     <p:extLst>
       <p:ext uri="{BB962C8B-B14F-4D97-AF65-F5344CB8AC3E}">
         <p14:creationId xmlns:p14="http://schemas.microsoft.com/office/powerpoint/2010/main" val="2610139530"/>
+      </p:ext>
+    </p:extLst>
+  </p:cSld>
+  <p:clrMapOvr>
+    <a:masterClrMapping/>
+  </p:clrMapOvr>
+  <p:timing>
+    <p:tnLst>
+      <p:par>
+        <p:cTn id="1" dur="indefinite" restart="never" nodeType="tmRoot"/>
+      </p:par>
+    </p:tnLst>
+  </p:timing>
+</p:sld>
+</file>
+
+<file path=ppt/slides/slide20.xml><?xml version="1.0" encoding="utf-8"?>
+<p:sld xmlns:a="http://schemas.openxmlformats.org/drawingml/2006/main" xmlns:r="http://schemas.openxmlformats.org/officeDocument/2006/relationships" xmlns:p="http://schemas.openxmlformats.org/presentationml/2006/main">
+  <p:cSld>
+    <p:spTree>
+      <p:nvGrpSpPr>
+        <p:cNvPr id="1" name=""/>
+        <p:cNvGrpSpPr/>
+        <p:nvPr/>
+      </p:nvGrpSpPr>
+      <p:grpSpPr>
+        <a:xfrm>
+          <a:off x="0" y="0"/>
+          <a:ext cx="0" cy="0"/>
+          <a:chOff x="0" y="0"/>
+          <a:chExt cx="0" cy="0"/>
+        </a:xfrm>
+      </p:grpSpPr>
+      <p:sp>
+        <p:nvSpPr>
+          <p:cNvPr id="2" name="Titel 1"/>
+          <p:cNvSpPr>
+            <a:spLocks noGrp="1"/>
+          </p:cNvSpPr>
+          <p:nvPr>
+            <p:ph type="title"/>
+          </p:nvPr>
+        </p:nvSpPr>
+        <p:spPr/>
+        <p:txBody>
+          <a:bodyPr>
+            <a:normAutofit/>
+          </a:bodyPr>
+          <a:lstStyle/>
+          <a:p>
+            <a:r>
+              <a:rPr lang="de-CH" dirty="0" err="1" smtClean="0"/>
+              <a:t>FAzit</a:t>
+            </a:r>
+            <a:endParaRPr lang="de-CH" dirty="0"/>
+          </a:p>
+        </p:txBody>
+      </p:sp>
+      <p:sp>
+        <p:nvSpPr>
+          <p:cNvPr id="4" name="Inhaltsplatzhalter 3"/>
+          <p:cNvSpPr>
+            <a:spLocks noGrp="1"/>
+          </p:cNvSpPr>
+          <p:nvPr>
+            <p:ph idx="1"/>
+          </p:nvPr>
+        </p:nvSpPr>
+        <p:spPr/>
+        <p:txBody>
+          <a:bodyPr>
+            <a:normAutofit/>
+          </a:bodyPr>
+          <a:lstStyle/>
+          <a:p>
+            <a:r>
+              <a:rPr lang="de-CH" dirty="0" smtClean="0"/>
+              <a:t>Herausforderndes Projekt</a:t>
+            </a:r>
+          </a:p>
+          <a:p>
+            <a:pPr lvl="1"/>
+            <a:r>
+              <a:rPr lang="de-CH" dirty="0" smtClean="0"/>
+              <a:t>Sehr befriedigendes Ergebnis</a:t>
+            </a:r>
+          </a:p>
+          <a:p>
+            <a:endParaRPr lang="de-CH" dirty="0" smtClean="0"/>
+          </a:p>
+          <a:p>
+            <a:r>
+              <a:rPr lang="de-CH" dirty="0" smtClean="0"/>
+              <a:t>Zusammenarbeit</a:t>
+            </a:r>
+          </a:p>
+          <a:p>
+            <a:pPr lvl="1"/>
+            <a:r>
+              <a:rPr lang="de-CH" dirty="0" smtClean="0"/>
+              <a:t>Grossartig</a:t>
+            </a:r>
+          </a:p>
+          <a:p>
+            <a:pPr lvl="1"/>
+            <a:endParaRPr lang="de-CH" dirty="0"/>
+          </a:p>
+          <a:p>
+            <a:r>
+              <a:rPr lang="de-CH" dirty="0" smtClean="0"/>
+              <a:t>Sackgassen aufgetreten ohne bedeutenden Einfluss auf die Zeitplanung.</a:t>
+            </a:r>
+          </a:p>
+          <a:p>
+            <a:endParaRPr lang="de-CH" dirty="0"/>
+          </a:p>
+          <a:p>
+            <a:r>
+              <a:rPr lang="de-CH" dirty="0" smtClean="0"/>
+              <a:t>Grosse Daten (Karte</a:t>
+            </a:r>
+            <a:r>
+              <a:rPr lang="de-CH" smtClean="0"/>
+              <a:t>) erschwerte die Fehlersuche</a:t>
+            </a:r>
+            <a:endParaRPr lang="de-CH" dirty="0"/>
+          </a:p>
+        </p:txBody>
+      </p:sp>
+    </p:spTree>
+    <p:extLst>
+      <p:ext uri="{BB962C8B-B14F-4D97-AF65-F5344CB8AC3E}">
+        <p14:creationId xmlns:p14="http://schemas.microsoft.com/office/powerpoint/2010/main" val="3995877694"/>
       </p:ext>
     </p:extLst>
   </p:cSld>

</xml_diff>

<commit_message>
- Presentation Preparation Julien
</commit_message>
<xml_diff>
--- a/doc/Searchrobot.pptx
+++ b/doc/Searchrobot.pptx
@@ -5,7 +5,7 @@
     <p:sldMasterId id="2147483828" r:id="rId1"/>
   </p:sldMasterIdLst>
   <p:notesMasterIdLst>
-    <p:notesMasterId r:id="rId22"/>
+    <p:notesMasterId r:id="rId24"/>
   </p:notesMasterIdLst>
   <p:sldIdLst>
     <p:sldId id="256" r:id="rId2"/>
@@ -25,9 +25,11 @@
     <p:sldId id="272" r:id="rId16"/>
     <p:sldId id="268" r:id="rId17"/>
     <p:sldId id="273" r:id="rId18"/>
-    <p:sldId id="274" r:id="rId19"/>
-    <p:sldId id="275" r:id="rId20"/>
-    <p:sldId id="276" r:id="rId21"/>
+    <p:sldId id="281" r:id="rId19"/>
+    <p:sldId id="280" r:id="rId20"/>
+    <p:sldId id="274" r:id="rId21"/>
+    <p:sldId id="275" r:id="rId22"/>
+    <p:sldId id="276" r:id="rId23"/>
   </p:sldIdLst>
   <p:sldSz cx="9144000" cy="6858000" type="screen4x3"/>
   <p:notesSz cx="6858000" cy="9144000"/>
@@ -227,7 +229,7 @@
           <a:p>
             <a:fld id="{F42A8115-F909-4BD7-92C8-BF31BA070AB9}" type="datetimeFigureOut">
               <a:rPr lang="de-CH" smtClean="0"/>
-              <a:t>11.01.2014</a:t>
+              <a:t>12.01.2014</a:t>
             </a:fld>
             <a:endParaRPr lang="de-CH"/>
           </a:p>
@@ -386,7 +388,7 @@
           <a:p>
             <a:fld id="{B8552C9E-37DA-4965-A8A0-AA9C20C3E2D9}" type="slidenum">
               <a:rPr lang="de-CH" smtClean="0"/>
-              <a:t>‹#›</a:t>
+              <a:t>‹Nr.›</a:t>
             </a:fld>
             <a:endParaRPr lang="de-CH"/>
           </a:p>
@@ -2125,7 +2127,7 @@
           <a:p>
             <a:fld id="{6FAC6EEE-FE3A-4B7F-856A-83697D8C29E8}" type="datetimeFigureOut">
               <a:rPr lang="de-CH" smtClean="0"/>
-              <a:t>11.01.2014</a:t>
+              <a:t>12.01.2014</a:t>
             </a:fld>
             <a:endParaRPr lang="de-CH"/>
           </a:p>
@@ -2169,7 +2171,7 @@
           <a:p>
             <a:fld id="{2495AE97-9321-4CC0-B0D8-307E6411C281}" type="slidenum">
               <a:rPr lang="de-CH" smtClean="0"/>
-              <a:t>‹#›</a:t>
+              <a:t>‹Nr.›</a:t>
             </a:fld>
             <a:endParaRPr lang="de-CH"/>
           </a:p>
@@ -3230,7 +3232,7 @@
           <a:p>
             <a:fld id="{6FAC6EEE-FE3A-4B7F-856A-83697D8C29E8}" type="datetimeFigureOut">
               <a:rPr lang="de-CH" smtClean="0"/>
-              <a:t>11.01.2014</a:t>
+              <a:t>12.01.2014</a:t>
             </a:fld>
             <a:endParaRPr lang="de-CH"/>
           </a:p>
@@ -3272,7 +3274,7 @@
           <a:p>
             <a:fld id="{2495AE97-9321-4CC0-B0D8-307E6411C281}" type="slidenum">
               <a:rPr lang="de-CH" smtClean="0"/>
-              <a:t>‹#›</a:t>
+              <a:t>‹Nr.›</a:t>
             </a:fld>
             <a:endParaRPr lang="de-CH"/>
           </a:p>
@@ -4343,7 +4345,7 @@
           <a:p>
             <a:fld id="{6FAC6EEE-FE3A-4B7F-856A-83697D8C29E8}" type="datetimeFigureOut">
               <a:rPr lang="de-CH" smtClean="0"/>
-              <a:t>11.01.2014</a:t>
+              <a:t>12.01.2014</a:t>
             </a:fld>
             <a:endParaRPr lang="de-CH"/>
           </a:p>
@@ -4385,7 +4387,7 @@
           <a:p>
             <a:fld id="{2495AE97-9321-4CC0-B0D8-307E6411C281}" type="slidenum">
               <a:rPr lang="de-CH" smtClean="0"/>
-              <a:t>‹#›</a:t>
+              <a:t>‹Nr.›</a:t>
             </a:fld>
             <a:endParaRPr lang="de-CH"/>
           </a:p>
@@ -5451,7 +5453,7 @@
           <a:p>
             <a:fld id="{6FAC6EEE-FE3A-4B7F-856A-83697D8C29E8}" type="datetimeFigureOut">
               <a:rPr lang="de-CH" smtClean="0"/>
-              <a:t>11.01.2014</a:t>
+              <a:t>12.01.2014</a:t>
             </a:fld>
             <a:endParaRPr lang="de-CH"/>
           </a:p>
@@ -5493,7 +5495,7 @@
           <a:p>
             <a:fld id="{2495AE97-9321-4CC0-B0D8-307E6411C281}" type="slidenum">
               <a:rPr lang="de-CH" smtClean="0"/>
-              <a:t>‹#›</a:t>
+              <a:t>‹Nr.›</a:t>
             </a:fld>
             <a:endParaRPr lang="de-CH"/>
           </a:p>
@@ -7044,7 +7046,7 @@
           <a:p>
             <a:fld id="{6FAC6EEE-FE3A-4B7F-856A-83697D8C29E8}" type="datetimeFigureOut">
               <a:rPr lang="de-CH" smtClean="0"/>
-              <a:t>11.01.2014</a:t>
+              <a:t>12.01.2014</a:t>
             </a:fld>
             <a:endParaRPr lang="de-CH"/>
           </a:p>
@@ -7086,7 +7088,7 @@
           <a:p>
             <a:fld id="{2495AE97-9321-4CC0-B0D8-307E6411C281}" type="slidenum">
               <a:rPr lang="de-CH" smtClean="0"/>
-              <a:t>‹#›</a:t>
+              <a:t>‹Nr.›</a:t>
             </a:fld>
             <a:endParaRPr lang="de-CH"/>
           </a:p>
@@ -8102,7 +8104,7 @@
           <a:p>
             <a:fld id="{6FAC6EEE-FE3A-4B7F-856A-83697D8C29E8}" type="datetimeFigureOut">
               <a:rPr lang="de-CH" smtClean="0"/>
-              <a:t>11.01.2014</a:t>
+              <a:t>12.01.2014</a:t>
             </a:fld>
             <a:endParaRPr lang="de-CH"/>
           </a:p>
@@ -8144,7 +8146,7 @@
           <a:p>
             <a:fld id="{2495AE97-9321-4CC0-B0D8-307E6411C281}" type="slidenum">
               <a:rPr lang="de-CH" smtClean="0"/>
-              <a:t>‹#›</a:t>
+              <a:t>‹Nr.›</a:t>
             </a:fld>
             <a:endParaRPr lang="de-CH"/>
           </a:p>
@@ -9429,7 +9431,7 @@
           <a:p>
             <a:fld id="{6FAC6EEE-FE3A-4B7F-856A-83697D8C29E8}" type="datetimeFigureOut">
               <a:rPr lang="de-CH" smtClean="0"/>
-              <a:t>11.01.2014</a:t>
+              <a:t>12.01.2014</a:t>
             </a:fld>
             <a:endParaRPr lang="de-CH"/>
           </a:p>
@@ -9471,7 +9473,7 @@
           <a:p>
             <a:fld id="{2495AE97-9321-4CC0-B0D8-307E6411C281}" type="slidenum">
               <a:rPr lang="de-CH" smtClean="0"/>
-              <a:t>‹#›</a:t>
+              <a:t>‹Nr.›</a:t>
             </a:fld>
             <a:endParaRPr lang="de-CH"/>
           </a:p>
@@ -10566,7 +10568,7 @@
           <a:p>
             <a:fld id="{6FAC6EEE-FE3A-4B7F-856A-83697D8C29E8}" type="datetimeFigureOut">
               <a:rPr lang="de-CH" smtClean="0"/>
-              <a:t>11.01.2014</a:t>
+              <a:t>12.01.2014</a:t>
             </a:fld>
             <a:endParaRPr lang="de-CH"/>
           </a:p>
@@ -10608,7 +10610,7 @@
           <a:p>
             <a:fld id="{2495AE97-9321-4CC0-B0D8-307E6411C281}" type="slidenum">
               <a:rPr lang="de-CH" smtClean="0"/>
-              <a:t>‹#›</a:t>
+              <a:t>‹Nr.›</a:t>
             </a:fld>
             <a:endParaRPr lang="de-CH"/>
           </a:p>
@@ -11622,7 +11624,7 @@
           <a:p>
             <a:fld id="{6FAC6EEE-FE3A-4B7F-856A-83697D8C29E8}" type="datetimeFigureOut">
               <a:rPr lang="de-CH" smtClean="0"/>
-              <a:t>11.01.2014</a:t>
+              <a:t>12.01.2014</a:t>
             </a:fld>
             <a:endParaRPr lang="de-CH"/>
           </a:p>
@@ -11664,7 +11666,7 @@
           <a:p>
             <a:fld id="{2495AE97-9321-4CC0-B0D8-307E6411C281}" type="slidenum">
               <a:rPr lang="de-CH" smtClean="0"/>
-              <a:t>‹#›</a:t>
+              <a:t>‹Nr.›</a:t>
             </a:fld>
             <a:endParaRPr lang="de-CH"/>
           </a:p>
@@ -12660,7 +12662,7 @@
           <a:p>
             <a:fld id="{6FAC6EEE-FE3A-4B7F-856A-83697D8C29E8}" type="datetimeFigureOut">
               <a:rPr lang="de-CH" smtClean="0"/>
-              <a:t>11.01.2014</a:t>
+              <a:t>12.01.2014</a:t>
             </a:fld>
             <a:endParaRPr lang="de-CH"/>
           </a:p>
@@ -12702,7 +12704,7 @@
           <a:p>
             <a:fld id="{2495AE97-9321-4CC0-B0D8-307E6411C281}" type="slidenum">
               <a:rPr lang="de-CH" smtClean="0"/>
-              <a:t>‹#›</a:t>
+              <a:t>‹Nr.›</a:t>
             </a:fld>
             <a:endParaRPr lang="de-CH"/>
           </a:p>
@@ -13895,7 +13897,7 @@
           <a:p>
             <a:fld id="{6FAC6EEE-FE3A-4B7F-856A-83697D8C29E8}" type="datetimeFigureOut">
               <a:rPr lang="de-CH" smtClean="0"/>
-              <a:t>11.01.2014</a:t>
+              <a:t>12.01.2014</a:t>
             </a:fld>
             <a:endParaRPr lang="de-CH"/>
           </a:p>
@@ -13937,7 +13939,7 @@
           <a:p>
             <a:fld id="{2495AE97-9321-4CC0-B0D8-307E6411C281}" type="slidenum">
               <a:rPr lang="de-CH" smtClean="0"/>
-              <a:t>‹#›</a:t>
+              <a:t>‹Nr.›</a:t>
             </a:fld>
             <a:endParaRPr lang="de-CH"/>
           </a:p>
@@ -14248,7 +14250,7 @@
           <a:p>
             <a:fld id="{6FAC6EEE-FE3A-4B7F-856A-83697D8C29E8}" type="datetimeFigureOut">
               <a:rPr lang="de-CH" smtClean="0"/>
-              <a:t>11.01.2014</a:t>
+              <a:t>12.01.2014</a:t>
             </a:fld>
             <a:endParaRPr lang="de-CH"/>
           </a:p>
@@ -14322,7 +14324,7 @@
           <a:p>
             <a:fld id="{2495AE97-9321-4CC0-B0D8-307E6411C281}" type="slidenum">
               <a:rPr lang="de-CH" smtClean="0"/>
-              <a:t>‹#›</a:t>
+              <a:t>‹Nr.›</a:t>
             </a:fld>
             <a:endParaRPr lang="de-CH"/>
           </a:p>
@@ -15005,7 +15007,6 @@
               <a:rPr lang="de-CH" dirty="0" smtClean="0"/>
               <a:t>)</a:t>
             </a:r>
-            <a:endParaRPr lang="de-CH" dirty="0" smtClean="0"/>
           </a:p>
           <a:p>
             <a:pPr lvl="1"/>
@@ -15485,7 +15486,6 @@
               <a:rPr lang="de-CH" dirty="0" smtClean="0"/>
               <a:t>)</a:t>
             </a:r>
-            <a:endParaRPr lang="de-CH" dirty="0" smtClean="0"/>
           </a:p>
           <a:p>
             <a:pPr lvl="1"/>
@@ -15498,11 +15498,7 @@
             <a:pPr lvl="1"/>
             <a:r>
               <a:rPr lang="de-CH" dirty="0" smtClean="0"/>
-              <a:t>Verwaltung </a:t>
-            </a:r>
-            <a:r>
-              <a:rPr lang="de-CH" dirty="0" smtClean="0"/>
-              <a:t>der erkundeten Karte</a:t>
+              <a:t>Verwaltung der erkundeten Karte</a:t>
             </a:r>
           </a:p>
           <a:p>
@@ -15512,7 +15508,7 @@
           <a:p>
             <a:r>
               <a:rPr lang="de-CH" dirty="0" smtClean="0"/>
-              <a:t>Demo : Erste Abtastung</a:t>
+              <a:t>Demo: Erste Abtastung</a:t>
             </a:r>
             <a:endParaRPr lang="de-CH" dirty="0"/>
           </a:p>
@@ -15695,7 +15691,7 @@
         <p:spPr/>
         <p:txBody>
           <a:bodyPr>
-            <a:normAutofit fontScale="92500" lnSpcReduction="20000"/>
+            <a:normAutofit/>
           </a:bodyPr>
           <a:lstStyle/>
           <a:p>
@@ -15738,51 +15734,7 @@
               <a:rPr lang="de-CH" dirty="0" smtClean="0"/>
               <a:t>Rasterung der Karte</a:t>
             </a:r>
-          </a:p>
-          <a:p>
-            <a:pPr lvl="1"/>
-            <a:r>
-              <a:rPr lang="de-CH" dirty="0" smtClean="0"/>
-              <a:t>Sicherstellung Bewegung Roboter</a:t>
-            </a:r>
-          </a:p>
-          <a:p>
-            <a:pPr lvl="1"/>
-            <a:r>
-              <a:rPr lang="de-CH" dirty="0" smtClean="0"/>
-              <a:t>Leistung</a:t>
-            </a:r>
-          </a:p>
-          <a:p>
-            <a:pPr lvl="1"/>
             <a:endParaRPr lang="de-CH" dirty="0"/>
-          </a:p>
-          <a:p>
-            <a:r>
-              <a:rPr lang="de-CH" dirty="0" smtClean="0"/>
-              <a:t>Kollision</a:t>
-            </a:r>
-          </a:p>
-          <a:p>
-            <a:pPr lvl="1"/>
-            <a:r>
-              <a:rPr lang="de-CH" dirty="0" smtClean="0"/>
-              <a:t>Akzeptiert, wäre verhinderbar</a:t>
-            </a:r>
-          </a:p>
-          <a:p>
-            <a:pPr lvl="1"/>
-            <a:r>
-              <a:rPr lang="de-CH" dirty="0" smtClean="0"/>
-              <a:t>Neuorientierung</a:t>
-            </a:r>
-          </a:p>
-          <a:p>
-            <a:pPr lvl="1"/>
-            <a:r>
-              <a:rPr lang="de-CH" dirty="0" smtClean="0"/>
-              <a:t>Karteneditor Funktionalität</a:t>
-            </a:r>
           </a:p>
           <a:p>
             <a:pPr lvl="1"/>
@@ -15843,8 +15795,575 @@
         </p:nvSpPr>
         <p:spPr/>
         <p:txBody>
+          <a:bodyPr/>
+          <a:lstStyle/>
+          <a:p>
+            <a:r>
+              <a:rPr lang="de-CH" dirty="0" err="1" smtClean="0"/>
+              <a:t>PFadfindung</a:t>
+            </a:r>
+            <a:endParaRPr lang="de-CH" dirty="0"/>
+          </a:p>
+        </p:txBody>
+      </p:sp>
+      <p:sp>
+        <p:nvSpPr>
+          <p:cNvPr id="4" name="Inhaltsplatzhalter 3"/>
+          <p:cNvSpPr>
+            <a:spLocks noGrp="1"/>
+          </p:cNvSpPr>
+          <p:nvPr>
+            <p:ph idx="1"/>
+          </p:nvPr>
+        </p:nvSpPr>
+        <p:spPr/>
+        <p:txBody>
           <a:bodyPr>
-            <a:normAutofit/>
+            <a:normAutofit fontScale="92500" lnSpcReduction="20000"/>
+          </a:bodyPr>
+          <a:lstStyle/>
+          <a:p>
+            <a:r>
+              <a:rPr lang="de-CH" dirty="0" smtClean="0"/>
+              <a:t>Idee</a:t>
+            </a:r>
+          </a:p>
+          <a:p>
+            <a:pPr lvl="1"/>
+            <a:r>
+              <a:rPr lang="de-CH" dirty="0" smtClean="0"/>
+              <a:t>Bereich Erkundung (verworfen)</a:t>
+            </a:r>
+          </a:p>
+          <a:p>
+            <a:pPr lvl="1"/>
+            <a:r>
+              <a:rPr lang="de-CH" dirty="0"/>
+              <a:t>Kanten </a:t>
+            </a:r>
+            <a:r>
+              <a:rPr lang="de-CH" dirty="0" smtClean="0"/>
+              <a:t>der Schatten</a:t>
+            </a:r>
+          </a:p>
+          <a:p>
+            <a:pPr lvl="1"/>
+            <a:endParaRPr lang="de-CH" dirty="0"/>
+          </a:p>
+          <a:p>
+            <a:r>
+              <a:rPr lang="de-CH" dirty="0" smtClean="0"/>
+              <a:t>Dijkstra</a:t>
+            </a:r>
+          </a:p>
+          <a:p>
+            <a:pPr lvl="1"/>
+            <a:r>
+              <a:rPr lang="de-CH" dirty="0" smtClean="0"/>
+              <a:t>Rasterung der Karte</a:t>
+            </a:r>
+          </a:p>
+          <a:p>
+            <a:pPr lvl="1"/>
+            <a:r>
+              <a:rPr lang="de-CH" dirty="0" smtClean="0"/>
+              <a:t>Sicherstellung Bewegung Roboter</a:t>
+            </a:r>
+          </a:p>
+          <a:p>
+            <a:pPr lvl="1"/>
+            <a:r>
+              <a:rPr lang="de-CH" dirty="0" smtClean="0"/>
+              <a:t>Leistung</a:t>
+            </a:r>
+          </a:p>
+          <a:p>
+            <a:pPr lvl="1"/>
+            <a:endParaRPr lang="de-CH" dirty="0" smtClean="0"/>
+          </a:p>
+          <a:p>
+            <a:r>
+              <a:rPr lang="de-CH" dirty="0" smtClean="0"/>
+              <a:t>Kollision</a:t>
+            </a:r>
+          </a:p>
+          <a:p>
+            <a:pPr lvl="1"/>
+            <a:r>
+              <a:rPr lang="de-CH" dirty="0" smtClean="0"/>
+              <a:t>Akzeptiert, wäre </a:t>
+            </a:r>
+            <a:r>
+              <a:rPr lang="de-CH" dirty="0" err="1" smtClean="0"/>
+              <a:t>verhinderbar</a:t>
+            </a:r>
+            <a:endParaRPr lang="de-CH" dirty="0" smtClean="0"/>
+          </a:p>
+          <a:p>
+            <a:pPr lvl="1"/>
+            <a:r>
+              <a:rPr lang="de-CH" dirty="0" smtClean="0"/>
+              <a:t>Neuorientierung</a:t>
+            </a:r>
+          </a:p>
+          <a:p>
+            <a:pPr lvl="1"/>
+            <a:r>
+              <a:rPr lang="de-CH" dirty="0" smtClean="0"/>
+              <a:t>Karteneditor Funktionalität</a:t>
+            </a:r>
+          </a:p>
+          <a:p>
+            <a:pPr lvl="1"/>
+            <a:endParaRPr lang="de-CH" dirty="0" smtClean="0"/>
+          </a:p>
+          <a:p>
+            <a:pPr lvl="1"/>
+            <a:endParaRPr lang="de-CH" dirty="0"/>
+          </a:p>
+        </p:txBody>
+      </p:sp>
+      <p:pic>
+        <p:nvPicPr>
+          <p:cNvPr id="3" name="Grafik 2"/>
+          <p:cNvPicPr>
+            <a:picLocks noChangeAspect="1"/>
+          </p:cNvPicPr>
+          <p:nvPr/>
+        </p:nvPicPr>
+        <p:blipFill>
+          <a:blip r:embed="rId2">
+            <a:extLst>
+              <a:ext uri="{28A0092B-C50C-407E-A947-70E740481C1C}">
+                <a14:useLocalDpi xmlns:a14="http://schemas.microsoft.com/office/drawing/2010/main" val="0"/>
+              </a:ext>
+            </a:extLst>
+          </a:blip>
+          <a:stretch>
+            <a:fillRect/>
+          </a:stretch>
+        </p:blipFill>
+        <p:spPr>
+          <a:xfrm>
+            <a:off x="762000" y="571500"/>
+            <a:ext cx="7620000" cy="5715000"/>
+          </a:xfrm>
+          <a:prstGeom prst="rect">
+            <a:avLst/>
+          </a:prstGeom>
+        </p:spPr>
+      </p:pic>
+    </p:spTree>
+    <p:extLst>
+      <p:ext uri="{BB962C8B-B14F-4D97-AF65-F5344CB8AC3E}">
+        <p14:creationId xmlns:p14="http://schemas.microsoft.com/office/powerpoint/2010/main" val="2833923759"/>
+      </p:ext>
+    </p:extLst>
+  </p:cSld>
+  <p:clrMapOvr>
+    <a:masterClrMapping/>
+  </p:clrMapOvr>
+  <p:timing>
+    <p:tnLst>
+      <p:par>
+        <p:cTn id="1" dur="indefinite" restart="never" nodeType="tmRoot"/>
+      </p:par>
+    </p:tnLst>
+  </p:timing>
+</p:sld>
+</file>
+
+<file path=ppt/slides/slide19.xml><?xml version="1.0" encoding="utf-8"?>
+<p:sld xmlns:a="http://schemas.openxmlformats.org/drawingml/2006/main" xmlns:r="http://schemas.openxmlformats.org/officeDocument/2006/relationships" xmlns:p="http://schemas.openxmlformats.org/presentationml/2006/main">
+  <p:cSld>
+    <p:spTree>
+      <p:nvGrpSpPr>
+        <p:cNvPr id="1" name=""/>
+        <p:cNvGrpSpPr/>
+        <p:nvPr/>
+      </p:nvGrpSpPr>
+      <p:grpSpPr>
+        <a:xfrm>
+          <a:off x="0" y="0"/>
+          <a:ext cx="0" cy="0"/>
+          <a:chOff x="0" y="0"/>
+          <a:chExt cx="0" cy="0"/>
+        </a:xfrm>
+      </p:grpSpPr>
+      <p:sp>
+        <p:nvSpPr>
+          <p:cNvPr id="2" name="Titel 1"/>
+          <p:cNvSpPr>
+            <a:spLocks noGrp="1"/>
+          </p:cNvSpPr>
+          <p:nvPr>
+            <p:ph type="title"/>
+          </p:nvPr>
+        </p:nvSpPr>
+        <p:spPr/>
+        <p:txBody>
+          <a:bodyPr/>
+          <a:lstStyle/>
+          <a:p>
+            <a:r>
+              <a:rPr lang="de-CH" dirty="0" err="1" smtClean="0"/>
+              <a:t>PFadfindung</a:t>
+            </a:r>
+            <a:endParaRPr lang="de-CH" dirty="0"/>
+          </a:p>
+        </p:txBody>
+      </p:sp>
+      <p:sp>
+        <p:nvSpPr>
+          <p:cNvPr id="4" name="Inhaltsplatzhalter 3"/>
+          <p:cNvSpPr>
+            <a:spLocks noGrp="1"/>
+          </p:cNvSpPr>
+          <p:nvPr>
+            <p:ph idx="1"/>
+          </p:nvPr>
+        </p:nvSpPr>
+        <p:spPr/>
+        <p:txBody>
+          <a:bodyPr>
+            <a:normAutofit fontScale="92500" lnSpcReduction="20000"/>
+          </a:bodyPr>
+          <a:lstStyle/>
+          <a:p>
+            <a:r>
+              <a:rPr lang="de-CH" dirty="0" smtClean="0"/>
+              <a:t>Idee</a:t>
+            </a:r>
+          </a:p>
+          <a:p>
+            <a:pPr lvl="1"/>
+            <a:r>
+              <a:rPr lang="de-CH" dirty="0" smtClean="0"/>
+              <a:t>Bereich Erkundung (verworfen)</a:t>
+            </a:r>
+          </a:p>
+          <a:p>
+            <a:pPr lvl="1"/>
+            <a:r>
+              <a:rPr lang="de-CH" dirty="0"/>
+              <a:t>Kanten </a:t>
+            </a:r>
+            <a:r>
+              <a:rPr lang="de-CH" dirty="0" smtClean="0"/>
+              <a:t>der Schatten</a:t>
+            </a:r>
+          </a:p>
+          <a:p>
+            <a:pPr lvl="1"/>
+            <a:endParaRPr lang="de-CH" dirty="0"/>
+          </a:p>
+          <a:p>
+            <a:r>
+              <a:rPr lang="de-CH" dirty="0" smtClean="0"/>
+              <a:t>Dijkstra</a:t>
+            </a:r>
+          </a:p>
+          <a:p>
+            <a:pPr lvl="1"/>
+            <a:r>
+              <a:rPr lang="de-CH" dirty="0" smtClean="0"/>
+              <a:t>Rasterung der Karte</a:t>
+            </a:r>
+          </a:p>
+          <a:p>
+            <a:pPr lvl="1"/>
+            <a:r>
+              <a:rPr lang="de-CH" dirty="0" smtClean="0"/>
+              <a:t>Sicherstellung Bewegung Roboter</a:t>
+            </a:r>
+          </a:p>
+          <a:p>
+            <a:pPr lvl="1"/>
+            <a:r>
+              <a:rPr lang="de-CH" dirty="0" smtClean="0"/>
+              <a:t>Leistung</a:t>
+            </a:r>
+          </a:p>
+          <a:p>
+            <a:pPr lvl="1"/>
+            <a:endParaRPr lang="de-CH" dirty="0"/>
+          </a:p>
+          <a:p>
+            <a:r>
+              <a:rPr lang="de-CH" dirty="0" smtClean="0"/>
+              <a:t>Kollision</a:t>
+            </a:r>
+          </a:p>
+          <a:p>
+            <a:pPr lvl="1"/>
+            <a:r>
+              <a:rPr lang="de-CH" dirty="0" smtClean="0"/>
+              <a:t>Akzeptiert, wäre verhinderbar</a:t>
+            </a:r>
+          </a:p>
+          <a:p>
+            <a:pPr lvl="1"/>
+            <a:r>
+              <a:rPr lang="de-CH" dirty="0" smtClean="0"/>
+              <a:t>Neuorientierung</a:t>
+            </a:r>
+          </a:p>
+          <a:p>
+            <a:pPr lvl="1"/>
+            <a:r>
+              <a:rPr lang="de-CH" dirty="0" smtClean="0"/>
+              <a:t>Karteneditor Funktionalität</a:t>
+            </a:r>
+          </a:p>
+          <a:p>
+            <a:pPr lvl="1"/>
+            <a:endParaRPr lang="de-CH" dirty="0" smtClean="0"/>
+          </a:p>
+          <a:p>
+            <a:pPr lvl="1"/>
+            <a:endParaRPr lang="de-CH" dirty="0"/>
+          </a:p>
+        </p:txBody>
+      </p:sp>
+    </p:spTree>
+    <p:extLst>
+      <p:ext uri="{BB962C8B-B14F-4D97-AF65-F5344CB8AC3E}">
+        <p14:creationId xmlns:p14="http://schemas.microsoft.com/office/powerpoint/2010/main" val="1500849254"/>
+      </p:ext>
+    </p:extLst>
+  </p:cSld>
+  <p:clrMapOvr>
+    <a:masterClrMapping/>
+  </p:clrMapOvr>
+  <p:timing>
+    <p:tnLst>
+      <p:par>
+        <p:cTn id="1" dur="indefinite" restart="never" nodeType="tmRoot"/>
+      </p:par>
+    </p:tnLst>
+  </p:timing>
+</p:sld>
+</file>
+
+<file path=ppt/slides/slide2.xml><?xml version="1.0" encoding="utf-8"?>
+<p:sld xmlns:a="http://schemas.openxmlformats.org/drawingml/2006/main" xmlns:r="http://schemas.openxmlformats.org/officeDocument/2006/relationships" xmlns:p="http://schemas.openxmlformats.org/presentationml/2006/main">
+  <p:cSld>
+    <p:spTree>
+      <p:nvGrpSpPr>
+        <p:cNvPr id="1" name=""/>
+        <p:cNvGrpSpPr/>
+        <p:nvPr/>
+      </p:nvGrpSpPr>
+      <p:grpSpPr>
+        <a:xfrm>
+          <a:off x="0" y="0"/>
+          <a:ext cx="0" cy="0"/>
+          <a:chOff x="0" y="0"/>
+          <a:chExt cx="0" cy="0"/>
+        </a:xfrm>
+      </p:grpSpPr>
+      <p:sp>
+        <p:nvSpPr>
+          <p:cNvPr id="3" name="Titel 2"/>
+          <p:cNvSpPr>
+            <a:spLocks noGrp="1"/>
+          </p:cNvSpPr>
+          <p:nvPr>
+            <p:ph type="title"/>
+          </p:nvPr>
+        </p:nvSpPr>
+        <p:spPr/>
+        <p:txBody>
+          <a:bodyPr/>
+          <a:lstStyle/>
+          <a:p>
+            <a:r>
+              <a:rPr lang="de-CH" dirty="0" smtClean="0"/>
+              <a:t>Ablauf</a:t>
+            </a:r>
+            <a:endParaRPr lang="de-CH" dirty="0"/>
+          </a:p>
+        </p:txBody>
+      </p:sp>
+      <p:sp>
+        <p:nvSpPr>
+          <p:cNvPr id="4" name="Textplatzhalter 3"/>
+          <p:cNvSpPr>
+            <a:spLocks noGrp="1"/>
+          </p:cNvSpPr>
+          <p:nvPr>
+            <p:ph type="body" sz="quarter" idx="14"/>
+          </p:nvPr>
+        </p:nvSpPr>
+        <p:spPr/>
+        <p:txBody>
+          <a:bodyPr/>
+          <a:lstStyle/>
+          <a:p>
+            <a:r>
+              <a:rPr lang="de-CH" dirty="0" smtClean="0"/>
+              <a:t>Vision</a:t>
+            </a:r>
+          </a:p>
+          <a:p>
+            <a:r>
+              <a:rPr lang="de-CH" dirty="0" smtClean="0"/>
+              <a:t>Karteneditor</a:t>
+            </a:r>
+          </a:p>
+          <a:p>
+            <a:r>
+              <a:rPr lang="de-CH" dirty="0" smtClean="0"/>
+              <a:t>Simulation</a:t>
+            </a:r>
+          </a:p>
+          <a:p>
+            <a:r>
+              <a:rPr lang="de-CH" dirty="0"/>
+              <a:t>	</a:t>
+            </a:r>
+            <a:r>
+              <a:rPr lang="de-CH" dirty="0" smtClean="0"/>
+              <a:t>Entdeckung</a:t>
+            </a:r>
+          </a:p>
+          <a:p>
+            <a:r>
+              <a:rPr lang="de-CH" dirty="0"/>
+              <a:t>	</a:t>
+            </a:r>
+            <a:r>
+              <a:rPr lang="de-CH" dirty="0" err="1" smtClean="0"/>
+              <a:t>Minimap</a:t>
+            </a:r>
+            <a:endParaRPr lang="de-CH" dirty="0" smtClean="0"/>
+          </a:p>
+          <a:p>
+            <a:r>
+              <a:rPr lang="de-CH" dirty="0"/>
+              <a:t>	</a:t>
+            </a:r>
+            <a:r>
+              <a:rPr lang="de-CH" dirty="0" smtClean="0"/>
+              <a:t>Pfadfindung</a:t>
+            </a:r>
+          </a:p>
+          <a:p>
+            <a:r>
+              <a:rPr lang="de-CH" dirty="0" smtClean="0"/>
+              <a:t>Herausforderungen des Roboters</a:t>
+            </a:r>
+          </a:p>
+          <a:p>
+            <a:r>
+              <a:rPr lang="de-CH" dirty="0" smtClean="0"/>
+              <a:t>Projektablauf</a:t>
+            </a:r>
+          </a:p>
+          <a:p>
+            <a:r>
+              <a:rPr lang="de-CH" dirty="0" smtClean="0"/>
+              <a:t>Fazit</a:t>
+            </a:r>
+          </a:p>
+          <a:p>
+            <a:endParaRPr lang="de-CH" dirty="0" smtClean="0"/>
+          </a:p>
+          <a:p>
+            <a:endParaRPr lang="de-CH" dirty="0"/>
+          </a:p>
+        </p:txBody>
+      </p:sp>
+      <p:pic>
+        <p:nvPicPr>
+          <p:cNvPr id="5" name="Bildplatzhalter 4"/>
+          <p:cNvPicPr>
+            <a:picLocks noGrp="1" noChangeAspect="1"/>
+          </p:cNvPicPr>
+          <p:nvPr>
+            <p:ph type="pic" idx="1"/>
+          </p:nvPr>
+        </p:nvPicPr>
+        <p:blipFill>
+          <a:blip r:embed="rId2">
+            <a:extLst>
+              <a:ext uri="{28A0092B-C50C-407E-A947-70E740481C1C}">
+                <a14:useLocalDpi xmlns:a14="http://schemas.microsoft.com/office/drawing/2010/main" val="0"/>
+              </a:ext>
+            </a:extLst>
+          </a:blip>
+          <a:srcRect t="2508" b="2508"/>
+          <a:stretch>
+            <a:fillRect/>
+          </a:stretch>
+        </p:blipFill>
+        <p:spPr>
+          <a:prstGeom prst="rect">
+            <a:avLst/>
+          </a:prstGeom>
+          <a:ln>
+            <a:noFill/>
+          </a:ln>
+          <a:effectLst>
+            <a:outerShdw blurRad="292100" dist="139700" dir="2700000" algn="tl" rotWithShape="0">
+              <a:srgbClr val="333333">
+                <a:alpha val="65000"/>
+              </a:srgbClr>
+            </a:outerShdw>
+          </a:effectLst>
+        </p:spPr>
+      </p:pic>
+    </p:spTree>
+    <p:extLst>
+      <p:ext uri="{BB962C8B-B14F-4D97-AF65-F5344CB8AC3E}">
+        <p14:creationId xmlns:p14="http://schemas.microsoft.com/office/powerpoint/2010/main" val="2610139530"/>
+      </p:ext>
+    </p:extLst>
+  </p:cSld>
+  <p:clrMapOvr>
+    <a:masterClrMapping/>
+  </p:clrMapOvr>
+  <p:timing>
+    <p:tnLst>
+      <p:par>
+        <p:cTn id="1" dur="indefinite" restart="never" nodeType="tmRoot"/>
+      </p:par>
+    </p:tnLst>
+  </p:timing>
+</p:sld>
+</file>
+
+<file path=ppt/slides/slide20.xml><?xml version="1.0" encoding="utf-8"?>
+<p:sld xmlns:a="http://schemas.openxmlformats.org/drawingml/2006/main" xmlns:r="http://schemas.openxmlformats.org/officeDocument/2006/relationships" xmlns:p="http://schemas.openxmlformats.org/presentationml/2006/main">
+  <p:cSld>
+    <p:spTree>
+      <p:nvGrpSpPr>
+        <p:cNvPr id="1" name=""/>
+        <p:cNvGrpSpPr/>
+        <p:nvPr/>
+      </p:nvGrpSpPr>
+      <p:grpSpPr>
+        <a:xfrm>
+          <a:off x="0" y="0"/>
+          <a:ext cx="0" cy="0"/>
+          <a:chOff x="0" y="0"/>
+          <a:chExt cx="0" cy="0"/>
+        </a:xfrm>
+      </p:grpSpPr>
+      <p:sp>
+        <p:nvSpPr>
+          <p:cNvPr id="2" name="Titel 1"/>
+          <p:cNvSpPr>
+            <a:spLocks noGrp="1"/>
+          </p:cNvSpPr>
+          <p:nvPr>
+            <p:ph type="title"/>
+          </p:nvPr>
+        </p:nvSpPr>
+        <p:spPr/>
+        <p:txBody>
+          <a:bodyPr>
+            <a:normAutofit fontScale="90000"/>
           </a:bodyPr>
           <a:lstStyle/>
           <a:p>
@@ -15942,7 +16461,7 @@
 </p:sld>
 </file>
 
-<file path=ppt/slides/slide19.xml><?xml version="1.0" encoding="utf-8"?>
+<file path=ppt/slides/slide21.xml><?xml version="1.0" encoding="utf-8"?>
 <p:sld xmlns:a="http://schemas.openxmlformats.org/drawingml/2006/main" xmlns:r="http://schemas.openxmlformats.org/officeDocument/2006/relationships" xmlns:p="http://schemas.openxmlformats.org/presentationml/2006/main">
   <p:cSld>
     <p:spTree>
@@ -16134,195 +16653,7 @@
 </p:sld>
 </file>
 
-<file path=ppt/slides/slide2.xml><?xml version="1.0" encoding="utf-8"?>
-<p:sld xmlns:a="http://schemas.openxmlformats.org/drawingml/2006/main" xmlns:r="http://schemas.openxmlformats.org/officeDocument/2006/relationships" xmlns:p="http://schemas.openxmlformats.org/presentationml/2006/main">
-  <p:cSld>
-    <p:spTree>
-      <p:nvGrpSpPr>
-        <p:cNvPr id="1" name=""/>
-        <p:cNvGrpSpPr/>
-        <p:nvPr/>
-      </p:nvGrpSpPr>
-      <p:grpSpPr>
-        <a:xfrm>
-          <a:off x="0" y="0"/>
-          <a:ext cx="0" cy="0"/>
-          <a:chOff x="0" y="0"/>
-          <a:chExt cx="0" cy="0"/>
-        </a:xfrm>
-      </p:grpSpPr>
-      <p:sp>
-        <p:nvSpPr>
-          <p:cNvPr id="3" name="Titel 2"/>
-          <p:cNvSpPr>
-            <a:spLocks noGrp="1"/>
-          </p:cNvSpPr>
-          <p:nvPr>
-            <p:ph type="title"/>
-          </p:nvPr>
-        </p:nvSpPr>
-        <p:spPr/>
-        <p:txBody>
-          <a:bodyPr/>
-          <a:lstStyle/>
-          <a:p>
-            <a:r>
-              <a:rPr lang="de-CH" dirty="0" smtClean="0"/>
-              <a:t>Ablauf</a:t>
-            </a:r>
-            <a:endParaRPr lang="de-CH" dirty="0"/>
-          </a:p>
-        </p:txBody>
-      </p:sp>
-      <p:sp>
-        <p:nvSpPr>
-          <p:cNvPr id="4" name="Textplatzhalter 3"/>
-          <p:cNvSpPr>
-            <a:spLocks noGrp="1"/>
-          </p:cNvSpPr>
-          <p:nvPr>
-            <p:ph type="body" sz="quarter" idx="14"/>
-          </p:nvPr>
-        </p:nvSpPr>
-        <p:spPr/>
-        <p:txBody>
-          <a:bodyPr/>
-          <a:lstStyle/>
-          <a:p>
-            <a:r>
-              <a:rPr lang="de-CH" dirty="0" smtClean="0"/>
-              <a:t>Vision</a:t>
-            </a:r>
-          </a:p>
-          <a:p>
-            <a:r>
-              <a:rPr lang="de-CH" dirty="0" smtClean="0"/>
-              <a:t>Karteneditor</a:t>
-            </a:r>
-          </a:p>
-          <a:p>
-            <a:r>
-              <a:rPr lang="de-CH" dirty="0" smtClean="0"/>
-              <a:t>Simulation</a:t>
-            </a:r>
-          </a:p>
-          <a:p>
-            <a:r>
-              <a:rPr lang="de-CH" dirty="0"/>
-              <a:t>	</a:t>
-            </a:r>
-            <a:r>
-              <a:rPr lang="de-CH" dirty="0" smtClean="0"/>
-              <a:t>Entdeckung</a:t>
-            </a:r>
-          </a:p>
-          <a:p>
-            <a:r>
-              <a:rPr lang="de-CH" dirty="0"/>
-              <a:t>	</a:t>
-            </a:r>
-            <a:r>
-              <a:rPr lang="de-CH" dirty="0" err="1" smtClean="0"/>
-              <a:t>Minimap</a:t>
-            </a:r>
-            <a:endParaRPr lang="de-CH" dirty="0" smtClean="0"/>
-          </a:p>
-          <a:p>
-            <a:r>
-              <a:rPr lang="de-CH" dirty="0"/>
-              <a:t>	</a:t>
-            </a:r>
-            <a:r>
-              <a:rPr lang="de-CH" dirty="0" smtClean="0"/>
-              <a:t>Pfadfindung</a:t>
-            </a:r>
-          </a:p>
-          <a:p>
-            <a:r>
-              <a:rPr lang="de-CH" dirty="0" smtClean="0"/>
-              <a:t>Herausforderungen des Roboters</a:t>
-            </a:r>
-          </a:p>
-          <a:p>
-            <a:r>
-              <a:rPr lang="de-CH" dirty="0" smtClean="0"/>
-              <a:t>Projektablauf</a:t>
-            </a:r>
-          </a:p>
-          <a:p>
-            <a:r>
-              <a:rPr lang="de-CH" dirty="0" smtClean="0"/>
-              <a:t>Fazit</a:t>
-            </a:r>
-          </a:p>
-          <a:p>
-            <a:endParaRPr lang="de-CH" dirty="0" smtClean="0"/>
-          </a:p>
-          <a:p>
-            <a:endParaRPr lang="de-CH" dirty="0"/>
-          </a:p>
-        </p:txBody>
-      </p:sp>
-      <p:pic>
-        <p:nvPicPr>
-          <p:cNvPr id="1026" name="Picture 2" descr="http://i.usatoday.net/_common/_notches/ee4557f0-f92e-4888-9251-de3eda0ad3ed-Robot.jpg"/>
-          <p:cNvPicPr>
-            <a:picLocks noGrp="1" noChangeAspect="1" noChangeArrowheads="1"/>
-          </p:cNvPicPr>
-          <p:nvPr>
-            <p:ph type="pic" idx="1"/>
-          </p:nvPr>
-        </p:nvPicPr>
-        <p:blipFill>
-          <a:blip r:embed="rId2">
-            <a:extLst>
-              <a:ext uri="{28A0092B-C50C-407E-A947-70E740481C1C}">
-                <a14:useLocalDpi xmlns:a14="http://schemas.microsoft.com/office/drawing/2010/main" val="0"/>
-              </a:ext>
-            </a:extLst>
-          </a:blip>
-          <a:srcRect l="3636" r="3636"/>
-          <a:stretch>
-            <a:fillRect/>
-          </a:stretch>
-        </p:blipFill>
-        <p:spPr bwMode="auto">
-          <a:prstGeom prst="rect">
-            <a:avLst/>
-          </a:prstGeom>
-          <a:noFill/>
-          <a:extLst>
-            <a:ext uri="{909E8E84-426E-40DD-AFC4-6F175D3DCCD1}">
-              <a14:hiddenFill xmlns:a14="http://schemas.microsoft.com/office/drawing/2010/main">
-                <a:solidFill>
-                  <a:srgbClr val="FFFFFF"/>
-                </a:solidFill>
-              </a14:hiddenFill>
-            </a:ext>
-          </a:extLst>
-        </p:spPr>
-      </p:pic>
-    </p:spTree>
-    <p:extLst>
-      <p:ext uri="{BB962C8B-B14F-4D97-AF65-F5344CB8AC3E}">
-        <p14:creationId xmlns:p14="http://schemas.microsoft.com/office/powerpoint/2010/main" val="2610139530"/>
-      </p:ext>
-    </p:extLst>
-  </p:cSld>
-  <p:clrMapOvr>
-    <a:masterClrMapping/>
-  </p:clrMapOvr>
-  <p:timing>
-    <p:tnLst>
-      <p:par>
-        <p:cTn id="1" dur="indefinite" restart="never" nodeType="tmRoot"/>
-      </p:par>
-    </p:tnLst>
-  </p:timing>
-</p:sld>
-</file>
-
-<file path=ppt/slides/slide20.xml><?xml version="1.0" encoding="utf-8"?>
+<file path=ppt/slides/slide22.xml><?xml version="1.0" encoding="utf-8"?>
 <p:sld xmlns:a="http://schemas.openxmlformats.org/drawingml/2006/main" xmlns:r="http://schemas.openxmlformats.org/officeDocument/2006/relationships" xmlns:p="http://schemas.openxmlformats.org/presentationml/2006/main">
   <p:cSld>
     <p:spTree>
@@ -16416,8 +16747,13 @@
           <a:p>
             <a:r>
               <a:rPr lang="de-CH" dirty="0" smtClean="0"/>
-              <a:t>Sackgassen aufgetreten ohne bedeutenden Einfluss auf die Zeitplanung.</a:t>
-            </a:r>
+              <a:t>Sackgassen aufgetreten ohne bedeutenden Einfluss auf die </a:t>
+            </a:r>
+            <a:r>
+              <a:rPr lang="de-CH" dirty="0" smtClean="0"/>
+              <a:t>Zeitplanung</a:t>
+            </a:r>
+            <a:endParaRPr lang="de-CH" dirty="0" smtClean="0"/>
           </a:p>
           <a:p>
             <a:endParaRPr lang="de-CH" dirty="0"/>
@@ -16425,11 +16761,7 @@
           <a:p>
             <a:r>
               <a:rPr lang="de-CH" dirty="0" smtClean="0"/>
-              <a:t>Grosse Daten (Karte</a:t>
-            </a:r>
-            <a:r>
-              <a:rPr lang="de-CH" smtClean="0"/>
-              <a:t>) erschwerte die Fehlersuche</a:t>
+              <a:t>Grosse Daten (Karte) erschwerte die Fehlersuche</a:t>
             </a:r>
             <a:endParaRPr lang="de-CH" dirty="0"/>
           </a:p>
@@ -16662,7 +16994,7 @@
             <a:pPr lvl="1"/>
             <a:r>
               <a:rPr lang="de-CH" dirty="0" smtClean="0"/>
-              <a:t>Hindernisse : Wände und Kreise</a:t>
+              <a:t>Hindernisse: Wände und Kreise</a:t>
             </a:r>
           </a:p>
           <a:p>
@@ -17054,8 +17386,8 @@
               <a:t>Trennung von </a:t>
             </a:r>
             <a:r>
-              <a:rPr lang="de-CH" dirty="0" err="1"/>
-              <a:t>Robotkompetenzen</a:t>
+              <a:rPr lang="de-CH" dirty="0" smtClean="0"/>
+              <a:t>Roboterkompetenzen</a:t>
             </a:r>
             <a:endParaRPr lang="de-CH" dirty="0"/>
           </a:p>

</xml_diff>